<commit_message>
Heatmap Powerpoint slides added images
</commit_message>
<xml_diff>
--- a/Heatmap.pptx
+++ b/Heatmap.pptx
@@ -9,8 +9,11 @@
     <p:sldId id="257" r:id="rId3"/>
     <p:sldId id="258" r:id="rId4"/>
     <p:sldId id="259" r:id="rId5"/>
-    <p:sldId id="260" r:id="rId6"/>
-    <p:sldId id="261" r:id="rId7"/>
+    <p:sldId id="262" r:id="rId6"/>
+    <p:sldId id="260" r:id="rId7"/>
+    <p:sldId id="263" r:id="rId8"/>
+    <p:sldId id="261" r:id="rId9"/>
+    <p:sldId id="264" r:id="rId10"/>
   </p:sldIdLst>
   <p:sldSz cx="12192000" cy="6858000"/>
   <p:notesSz cx="6858000" cy="9144000"/>
@@ -109,6 +112,11 @@
       </a:defRPr>
     </a:lvl9pPr>
   </p:defaultTextStyle>
+  <p:extLst>
+    <p:ext uri="{EFAFB233-063F-42B5-8137-9DF3F51BA10A}">
+      <p15:sldGuideLst xmlns:p15="http://schemas.microsoft.com/office/powerpoint/2012/main"/>
+    </p:ext>
+  </p:extLst>
 </p:presentation>
 </file>
 
@@ -259,7 +267,7 @@
           <a:p>
             <a:fld id="{3BC39719-94BB-4EC7-ACAA-5A117542A0DC}" type="datetimeFigureOut">
               <a:rPr lang="en-US" smtClean="0"/>
-              <a:t>4/10/2019</a:t>
+              <a:t>4/11/2019</a:t>
             </a:fld>
             <a:endParaRPr lang="en-US"/>
           </a:p>
@@ -457,7 +465,7 @@
           <a:p>
             <a:fld id="{3BC39719-94BB-4EC7-ACAA-5A117542A0DC}" type="datetimeFigureOut">
               <a:rPr lang="en-US" smtClean="0"/>
-              <a:t>4/10/2019</a:t>
+              <a:t>4/11/2019</a:t>
             </a:fld>
             <a:endParaRPr lang="en-US"/>
           </a:p>
@@ -665,7 +673,7 @@
           <a:p>
             <a:fld id="{3BC39719-94BB-4EC7-ACAA-5A117542A0DC}" type="datetimeFigureOut">
               <a:rPr lang="en-US" smtClean="0"/>
-              <a:t>4/10/2019</a:t>
+              <a:t>4/11/2019</a:t>
             </a:fld>
             <a:endParaRPr lang="en-US"/>
           </a:p>
@@ -863,7 +871,7 @@
           <a:p>
             <a:fld id="{3BC39719-94BB-4EC7-ACAA-5A117542A0DC}" type="datetimeFigureOut">
               <a:rPr lang="en-US" smtClean="0"/>
-              <a:t>4/10/2019</a:t>
+              <a:t>4/11/2019</a:t>
             </a:fld>
             <a:endParaRPr lang="en-US"/>
           </a:p>
@@ -1138,7 +1146,7 @@
           <a:p>
             <a:fld id="{3BC39719-94BB-4EC7-ACAA-5A117542A0DC}" type="datetimeFigureOut">
               <a:rPr lang="en-US" smtClean="0"/>
-              <a:t>4/10/2019</a:t>
+              <a:t>4/11/2019</a:t>
             </a:fld>
             <a:endParaRPr lang="en-US"/>
           </a:p>
@@ -1403,7 +1411,7 @@
           <a:p>
             <a:fld id="{3BC39719-94BB-4EC7-ACAA-5A117542A0DC}" type="datetimeFigureOut">
               <a:rPr lang="en-US" smtClean="0"/>
-              <a:t>4/10/2019</a:t>
+              <a:t>4/11/2019</a:t>
             </a:fld>
             <a:endParaRPr lang="en-US"/>
           </a:p>
@@ -1815,7 +1823,7 @@
           <a:p>
             <a:fld id="{3BC39719-94BB-4EC7-ACAA-5A117542A0DC}" type="datetimeFigureOut">
               <a:rPr lang="en-US" smtClean="0"/>
-              <a:t>4/10/2019</a:t>
+              <a:t>4/11/2019</a:t>
             </a:fld>
             <a:endParaRPr lang="en-US"/>
           </a:p>
@@ -1956,7 +1964,7 @@
           <a:p>
             <a:fld id="{3BC39719-94BB-4EC7-ACAA-5A117542A0DC}" type="datetimeFigureOut">
               <a:rPr lang="en-US" smtClean="0"/>
-              <a:t>4/10/2019</a:t>
+              <a:t>4/11/2019</a:t>
             </a:fld>
             <a:endParaRPr lang="en-US"/>
           </a:p>
@@ -2069,7 +2077,7 @@
           <a:p>
             <a:fld id="{3BC39719-94BB-4EC7-ACAA-5A117542A0DC}" type="datetimeFigureOut">
               <a:rPr lang="en-US" smtClean="0"/>
-              <a:t>4/10/2019</a:t>
+              <a:t>4/11/2019</a:t>
             </a:fld>
             <a:endParaRPr lang="en-US"/>
           </a:p>
@@ -2380,7 +2388,7 @@
           <a:p>
             <a:fld id="{3BC39719-94BB-4EC7-ACAA-5A117542A0DC}" type="datetimeFigureOut">
               <a:rPr lang="en-US" smtClean="0"/>
-              <a:t>4/10/2019</a:t>
+              <a:t>4/11/2019</a:t>
             </a:fld>
             <a:endParaRPr lang="en-US"/>
           </a:p>
@@ -2668,7 +2676,7 @@
           <a:p>
             <a:fld id="{3BC39719-94BB-4EC7-ACAA-5A117542A0DC}" type="datetimeFigureOut">
               <a:rPr lang="en-US" smtClean="0"/>
-              <a:t>4/10/2019</a:t>
+              <a:t>4/11/2019</a:t>
             </a:fld>
             <a:endParaRPr lang="en-US"/>
           </a:p>
@@ -2909,7 +2917,7 @@
           <a:p>
             <a:fld id="{3BC39719-94BB-4EC7-ACAA-5A117542A0DC}" type="datetimeFigureOut">
               <a:rPr lang="en-US" smtClean="0"/>
-              <a:t>4/10/2019</a:t>
+              <a:t>4/11/2019</a:t>
             </a:fld>
             <a:endParaRPr lang="en-US"/>
           </a:p>
@@ -3738,7 +3746,7 @@
           <p:cNvPr id="2" name="Title 1">
             <a:extLst>
               <a:ext uri="{FF2B5EF4-FFF2-40B4-BE49-F238E27FC236}">
-                <a16:creationId xmlns:a16="http://schemas.microsoft.com/office/drawing/2014/main" id="{CED5AF93-FE84-4C33-A55F-AD5CA21148C2}"/>
+                <a16:creationId xmlns:a16="http://schemas.microsoft.com/office/drawing/2014/main" id="{95CB08EB-A59E-403F-8BAC-ABB28D70F405}"/>
               </a:ext>
             </a:extLst>
           </p:cNvPr>
@@ -3756,58 +3764,50 @@
           <a:p>
             <a:r>
               <a:rPr lang="en-US" dirty="0"/>
-              <a:t>Gather + Cleanup (cont.)</a:t>
-            </a:r>
-          </a:p>
-        </p:txBody>
-      </p:sp>
-      <p:sp>
-        <p:nvSpPr>
-          <p:cNvPr id="3" name="Content Placeholder 2">
-            <a:extLst>
-              <a:ext uri="{FF2B5EF4-FFF2-40B4-BE49-F238E27FC236}">
-                <a16:creationId xmlns:a16="http://schemas.microsoft.com/office/drawing/2014/main" id="{2812280E-019F-45ED-B74C-BD00322D700B}"/>
-              </a:ext>
-            </a:extLst>
-          </p:cNvPr>
-          <p:cNvSpPr>
-            <a:spLocks noGrp="1"/>
-          </p:cNvSpPr>
+              <a:t>Code: Taking a Random Sample</a:t>
+            </a:r>
+          </a:p>
+        </p:txBody>
+      </p:sp>
+      <p:pic>
+        <p:nvPicPr>
+          <p:cNvPr id="5" name="Content Placeholder 4">
+            <a:extLst>
+              <a:ext uri="{FF2B5EF4-FFF2-40B4-BE49-F238E27FC236}">
+                <a16:creationId xmlns:a16="http://schemas.microsoft.com/office/drawing/2014/main" id="{7FB64BC3-4430-4F81-B691-6348A05C49BF}"/>
+              </a:ext>
+            </a:extLst>
+          </p:cNvPr>
+          <p:cNvPicPr>
+            <a:picLocks noGrp="1" noChangeAspect="1"/>
+          </p:cNvPicPr>
           <p:nvPr>
             <p:ph idx="1"/>
           </p:nvPr>
-        </p:nvSpPr>
-        <p:spPr/>
-        <p:txBody>
-          <a:bodyPr/>
-          <a:lstStyle/>
-          <a:p>
-            <a:r>
-              <a:rPr lang="en-US" dirty="0"/>
-              <a:t>Once the unusable rows were removed, the Lat/Long values were converted to a decimal value so that folium could understand them. The columns were also renamed since the dataset had them backwards.</a:t>
-            </a:r>
-          </a:p>
-          <a:p>
-            <a:r>
-              <a:rPr lang="en-US" dirty="0"/>
-              <a:t>This concluded the cleanup for the heatmap. At the end, the number of columns left were checked to ensure that there was a robust enough dataset left after all of the removals.</a:t>
-            </a:r>
-          </a:p>
-          <a:p>
-            <a:r>
-              <a:rPr lang="en-US" dirty="0"/>
-              <a:t>On average, the remaining dataset retained ~450K out of the original 500K rows.</a:t>
-            </a:r>
-          </a:p>
-          <a:p>
-            <a:endParaRPr lang="en-US" dirty="0"/>
-          </a:p>
-        </p:txBody>
-      </p:sp>
+        </p:nvPicPr>
+        <p:blipFill>
+          <a:blip r:embed="rId2">
+            <a:extLst>
+              <a:ext uri="{28A0092B-C50C-407E-A947-70E740481C1C}">
+                <a14:useLocalDpi xmlns:a14="http://schemas.microsoft.com/office/drawing/2010/main" val="0"/>
+              </a:ext>
+            </a:extLst>
+          </a:blip>
+          <a:stretch>
+            <a:fillRect/>
+          </a:stretch>
+        </p:blipFill>
+        <p:spPr>
+          <a:xfrm>
+            <a:off x="1189712" y="2659146"/>
+            <a:ext cx="9812575" cy="1539707"/>
+          </a:xfrm>
+        </p:spPr>
+      </p:pic>
     </p:spTree>
     <p:extLst>
       <p:ext uri="{BB962C8B-B14F-4D97-AF65-F5344CB8AC3E}">
-        <p14:creationId xmlns:p14="http://schemas.microsoft.com/office/powerpoint/2010/main" val="3761242689"/>
+        <p14:creationId xmlns:p14="http://schemas.microsoft.com/office/powerpoint/2010/main" val="2766980859"/>
       </p:ext>
     </p:extLst>
   </p:cSld>
@@ -3839,6 +3839,200 @@
           <p:cNvPr id="2" name="Title 1">
             <a:extLst>
               <a:ext uri="{FF2B5EF4-FFF2-40B4-BE49-F238E27FC236}">
+                <a16:creationId xmlns:a16="http://schemas.microsoft.com/office/drawing/2014/main" id="{CED5AF93-FE84-4C33-A55F-AD5CA21148C2}"/>
+              </a:ext>
+            </a:extLst>
+          </p:cNvPr>
+          <p:cNvSpPr>
+            <a:spLocks noGrp="1"/>
+          </p:cNvSpPr>
+          <p:nvPr>
+            <p:ph type="title"/>
+          </p:nvPr>
+        </p:nvSpPr>
+        <p:spPr/>
+        <p:txBody>
+          <a:bodyPr/>
+          <a:lstStyle/>
+          <a:p>
+            <a:r>
+              <a:rPr lang="en-US" dirty="0"/>
+              <a:t>Gather + Cleanup (cont.)</a:t>
+            </a:r>
+          </a:p>
+        </p:txBody>
+      </p:sp>
+      <p:sp>
+        <p:nvSpPr>
+          <p:cNvPr id="3" name="Content Placeholder 2">
+            <a:extLst>
+              <a:ext uri="{FF2B5EF4-FFF2-40B4-BE49-F238E27FC236}">
+                <a16:creationId xmlns:a16="http://schemas.microsoft.com/office/drawing/2014/main" id="{2812280E-019F-45ED-B74C-BD00322D700B}"/>
+              </a:ext>
+            </a:extLst>
+          </p:cNvPr>
+          <p:cNvSpPr>
+            <a:spLocks noGrp="1"/>
+          </p:cNvSpPr>
+          <p:nvPr>
+            <p:ph idx="1"/>
+          </p:nvPr>
+        </p:nvSpPr>
+        <p:spPr/>
+        <p:txBody>
+          <a:bodyPr/>
+          <a:lstStyle/>
+          <a:p>
+            <a:r>
+              <a:rPr lang="en-US" dirty="0"/>
+              <a:t>Once the unusable rows were removed, the Lat/Long values were converted to a decimal value so that folium could understand them. The columns were also renamed since the dataset had them backwards.</a:t>
+            </a:r>
+          </a:p>
+          <a:p>
+            <a:r>
+              <a:rPr lang="en-US" dirty="0"/>
+              <a:t>This concluded the cleanup for the heatmap. At the end, the number of columns left were checked to ensure that there was a robust enough dataset left after all of the removals.</a:t>
+            </a:r>
+          </a:p>
+          <a:p>
+            <a:r>
+              <a:rPr lang="en-US" dirty="0"/>
+              <a:t>On average, the remaining dataset retained ~450K out of the original 500K rows.</a:t>
+            </a:r>
+          </a:p>
+          <a:p>
+            <a:endParaRPr lang="en-US" dirty="0"/>
+          </a:p>
+        </p:txBody>
+      </p:sp>
+    </p:spTree>
+    <p:extLst>
+      <p:ext uri="{BB962C8B-B14F-4D97-AF65-F5344CB8AC3E}">
+        <p14:creationId xmlns:p14="http://schemas.microsoft.com/office/powerpoint/2010/main" val="3761242689"/>
+      </p:ext>
+    </p:extLst>
+  </p:cSld>
+  <p:clrMapOvr>
+    <a:masterClrMapping/>
+  </p:clrMapOvr>
+</p:sld>
+</file>
+
+<file path=ppt/slides/slide7.xml><?xml version="1.0" encoding="utf-8"?>
+<p:sld xmlns:a="http://schemas.openxmlformats.org/drawingml/2006/main" xmlns:r="http://schemas.openxmlformats.org/officeDocument/2006/relationships" xmlns:p="http://schemas.openxmlformats.org/presentationml/2006/main">
+  <p:cSld>
+    <p:spTree>
+      <p:nvGrpSpPr>
+        <p:cNvPr id="1" name=""/>
+        <p:cNvGrpSpPr/>
+        <p:nvPr/>
+      </p:nvGrpSpPr>
+      <p:grpSpPr>
+        <a:xfrm>
+          <a:off x="0" y="0"/>
+          <a:ext cx="0" cy="0"/>
+          <a:chOff x="0" y="0"/>
+          <a:chExt cx="0" cy="0"/>
+        </a:xfrm>
+      </p:grpSpPr>
+      <p:sp>
+        <p:nvSpPr>
+          <p:cNvPr id="2" name="Title 1">
+            <a:extLst>
+              <a:ext uri="{FF2B5EF4-FFF2-40B4-BE49-F238E27FC236}">
+                <a16:creationId xmlns:a16="http://schemas.microsoft.com/office/drawing/2014/main" id="{6470C916-171C-4B69-AA77-3C57025A545A}"/>
+              </a:ext>
+            </a:extLst>
+          </p:cNvPr>
+          <p:cNvSpPr>
+            <a:spLocks noGrp="1"/>
+          </p:cNvSpPr>
+          <p:nvPr>
+            <p:ph type="title"/>
+          </p:nvPr>
+        </p:nvSpPr>
+        <p:spPr/>
+        <p:txBody>
+          <a:bodyPr/>
+          <a:lstStyle/>
+          <a:p>
+            <a:r>
+              <a:rPr lang="en-US" dirty="0"/>
+              <a:t>Code: Lat/Long Conversion</a:t>
+            </a:r>
+          </a:p>
+        </p:txBody>
+      </p:sp>
+      <p:pic>
+        <p:nvPicPr>
+          <p:cNvPr id="5" name="Content Placeholder 4">
+            <a:extLst>
+              <a:ext uri="{FF2B5EF4-FFF2-40B4-BE49-F238E27FC236}">
+                <a16:creationId xmlns:a16="http://schemas.microsoft.com/office/drawing/2014/main" id="{2844E715-34BA-45B8-8FD5-CFC081915E48}"/>
+              </a:ext>
+            </a:extLst>
+          </p:cNvPr>
+          <p:cNvPicPr>
+            <a:picLocks noGrp="1" noChangeAspect="1"/>
+          </p:cNvPicPr>
+          <p:nvPr>
+            <p:ph idx="1"/>
+          </p:nvPr>
+        </p:nvPicPr>
+        <p:blipFill>
+          <a:blip r:embed="rId2">
+            <a:extLst>
+              <a:ext uri="{28A0092B-C50C-407E-A947-70E740481C1C}">
+                <a14:useLocalDpi xmlns:a14="http://schemas.microsoft.com/office/drawing/2010/main" val="0"/>
+              </a:ext>
+            </a:extLst>
+          </a:blip>
+          <a:stretch>
+            <a:fillRect/>
+          </a:stretch>
+        </p:blipFill>
+        <p:spPr>
+          <a:xfrm>
+            <a:off x="838200" y="3144383"/>
+            <a:ext cx="10515600" cy="1193705"/>
+          </a:xfrm>
+        </p:spPr>
+      </p:pic>
+    </p:spTree>
+    <p:extLst>
+      <p:ext uri="{BB962C8B-B14F-4D97-AF65-F5344CB8AC3E}">
+        <p14:creationId xmlns:p14="http://schemas.microsoft.com/office/powerpoint/2010/main" val="3149319434"/>
+      </p:ext>
+    </p:extLst>
+  </p:cSld>
+  <p:clrMapOvr>
+    <a:masterClrMapping/>
+  </p:clrMapOvr>
+</p:sld>
+</file>
+
+<file path=ppt/slides/slide8.xml><?xml version="1.0" encoding="utf-8"?>
+<p:sld xmlns:a="http://schemas.openxmlformats.org/drawingml/2006/main" xmlns:r="http://schemas.openxmlformats.org/officeDocument/2006/relationships" xmlns:p="http://schemas.openxmlformats.org/presentationml/2006/main">
+  <p:cSld>
+    <p:spTree>
+      <p:nvGrpSpPr>
+        <p:cNvPr id="1" name=""/>
+        <p:cNvGrpSpPr/>
+        <p:nvPr/>
+      </p:nvGrpSpPr>
+      <p:grpSpPr>
+        <a:xfrm>
+          <a:off x="0" y="0"/>
+          <a:ext cx="0" cy="0"/>
+          <a:chOff x="0" y="0"/>
+          <a:chExt cx="0" cy="0"/>
+        </a:xfrm>
+      </p:grpSpPr>
+      <p:sp>
+        <p:nvSpPr>
+          <p:cNvPr id="2" name="Title 1">
+            <a:extLst>
+              <a:ext uri="{FF2B5EF4-FFF2-40B4-BE49-F238E27FC236}">
                 <a16:creationId xmlns:a16="http://schemas.microsoft.com/office/drawing/2014/main" id="{E0A11501-1108-4B8D-9F4C-27A9943FA7BD}"/>
               </a:ext>
             </a:extLst>
@@ -3920,6 +4114,99 @@
     <p:extLst>
       <p:ext uri="{BB962C8B-B14F-4D97-AF65-F5344CB8AC3E}">
         <p14:creationId xmlns:p14="http://schemas.microsoft.com/office/powerpoint/2010/main" val="518961043"/>
+      </p:ext>
+    </p:extLst>
+  </p:cSld>
+  <p:clrMapOvr>
+    <a:masterClrMapping/>
+  </p:clrMapOvr>
+</p:sld>
+</file>
+
+<file path=ppt/slides/slide9.xml><?xml version="1.0" encoding="utf-8"?>
+<p:sld xmlns:a="http://schemas.openxmlformats.org/drawingml/2006/main" xmlns:r="http://schemas.openxmlformats.org/officeDocument/2006/relationships" xmlns:p="http://schemas.openxmlformats.org/presentationml/2006/main">
+  <p:cSld>
+    <p:spTree>
+      <p:nvGrpSpPr>
+        <p:cNvPr id="1" name=""/>
+        <p:cNvGrpSpPr/>
+        <p:nvPr/>
+      </p:nvGrpSpPr>
+      <p:grpSpPr>
+        <a:xfrm>
+          <a:off x="0" y="0"/>
+          <a:ext cx="0" cy="0"/>
+          <a:chOff x="0" y="0"/>
+          <a:chExt cx="0" cy="0"/>
+        </a:xfrm>
+      </p:grpSpPr>
+      <p:sp>
+        <p:nvSpPr>
+          <p:cNvPr id="2" name="Title 1">
+            <a:extLst>
+              <a:ext uri="{FF2B5EF4-FFF2-40B4-BE49-F238E27FC236}">
+                <a16:creationId xmlns:a16="http://schemas.microsoft.com/office/drawing/2014/main" id="{6D7D60BB-47A1-446B-82B1-E79D82450D49}"/>
+              </a:ext>
+            </a:extLst>
+          </p:cNvPr>
+          <p:cNvSpPr>
+            <a:spLocks noGrp="1"/>
+          </p:cNvSpPr>
+          <p:nvPr>
+            <p:ph type="title"/>
+          </p:nvPr>
+        </p:nvSpPr>
+        <p:spPr/>
+        <p:txBody>
+          <a:bodyPr/>
+          <a:lstStyle/>
+          <a:p>
+            <a:r>
+              <a:rPr lang="en-US" dirty="0"/>
+              <a:t>Code: Create Heatmap</a:t>
+            </a:r>
+          </a:p>
+        </p:txBody>
+      </p:sp>
+      <p:pic>
+        <p:nvPicPr>
+          <p:cNvPr id="5" name="Content Placeholder 4">
+            <a:extLst>
+              <a:ext uri="{FF2B5EF4-FFF2-40B4-BE49-F238E27FC236}">
+                <a16:creationId xmlns:a16="http://schemas.microsoft.com/office/drawing/2014/main" id="{4EF85A7B-6A75-4B32-ACB2-3C08F0882148}"/>
+              </a:ext>
+            </a:extLst>
+          </p:cNvPr>
+          <p:cNvPicPr>
+            <a:picLocks noGrp="1" noChangeAspect="1"/>
+          </p:cNvPicPr>
+          <p:nvPr>
+            <p:ph idx="1"/>
+          </p:nvPr>
+        </p:nvPicPr>
+        <p:blipFill>
+          <a:blip r:embed="rId2">
+            <a:extLst>
+              <a:ext uri="{28A0092B-C50C-407E-A947-70E740481C1C}">
+                <a14:useLocalDpi xmlns:a14="http://schemas.microsoft.com/office/drawing/2010/main" val="0"/>
+              </a:ext>
+            </a:extLst>
+          </a:blip>
+          <a:stretch>
+            <a:fillRect/>
+          </a:stretch>
+        </p:blipFill>
+        <p:spPr>
+          <a:xfrm>
+            <a:off x="1567344" y="2635483"/>
+            <a:ext cx="9057311" cy="1587034"/>
+          </a:xfrm>
+        </p:spPr>
+      </p:pic>
+    </p:spTree>
+    <p:extLst>
+      <p:ext uri="{BB962C8B-B14F-4D97-AF65-F5344CB8AC3E}">
+        <p14:creationId xmlns:p14="http://schemas.microsoft.com/office/powerpoint/2010/main" val="2067798395"/>
       </p:ext>
     </p:extLst>
   </p:cSld>

</xml_diff>